<commit_message>
firebase database rules, hosting
</commit_message>
<xml_diff>
--- a/faviconIcon.pptx
+++ b/faviconIcon.pptx
@@ -2,19 +2,19 @@
 <file path=ppt/presentation.xml><?xml version="1.0" encoding="utf-8"?>
 <p:presentation xmlns:a="http://schemas.openxmlformats.org/drawingml/2006/main" xmlns:r="http://schemas.openxmlformats.org/officeDocument/2006/relationships" xmlns:p="http://schemas.openxmlformats.org/presentationml/2006/main" removePersonalInfoOnSave="1" saveSubsetFonts="1">
   <p:sldMasterIdLst>
-    <p:sldMasterId id="2147483696" r:id="rId1"/>
+    <p:sldMasterId id="2147483708" r:id="rId1"/>
   </p:sldMasterIdLst>
   <p:sldIdLst>
     <p:sldId id="256" r:id="rId2"/>
   </p:sldIdLst>
-  <p:sldSz cx="7199313" cy="7199313"/>
+  <p:sldSz cx="8999538" cy="8999538"/>
   <p:notesSz cx="6858000" cy="9144000"/>
   <p:defaultTextStyle>
     <a:defPPr>
       <a:defRPr lang="de-DE"/>
     </a:defPPr>
-    <a:lvl1pPr marL="0" algn="l" defTabSz="691001" rtl="0" eaLnBrk="1" latinLnBrk="0" hangingPunct="1">
-      <a:defRPr sz="1360" kern="1200">
+    <a:lvl1pPr marL="0" algn="l" defTabSz="863751" rtl="0" eaLnBrk="1" latinLnBrk="0" hangingPunct="1">
+      <a:defRPr sz="1700" kern="1200">
         <a:solidFill>
           <a:schemeClr val="tx1"/>
         </a:solidFill>
@@ -23,8 +23,8 @@
         <a:cs typeface="+mn-cs"/>
       </a:defRPr>
     </a:lvl1pPr>
-    <a:lvl2pPr marL="345501" algn="l" defTabSz="691001" rtl="0" eaLnBrk="1" latinLnBrk="0" hangingPunct="1">
-      <a:defRPr sz="1360" kern="1200">
+    <a:lvl2pPr marL="431876" algn="l" defTabSz="863751" rtl="0" eaLnBrk="1" latinLnBrk="0" hangingPunct="1">
+      <a:defRPr sz="1700" kern="1200">
         <a:solidFill>
           <a:schemeClr val="tx1"/>
         </a:solidFill>
@@ -33,8 +33,8 @@
         <a:cs typeface="+mn-cs"/>
       </a:defRPr>
     </a:lvl2pPr>
-    <a:lvl3pPr marL="691001" algn="l" defTabSz="691001" rtl="0" eaLnBrk="1" latinLnBrk="0" hangingPunct="1">
-      <a:defRPr sz="1360" kern="1200">
+    <a:lvl3pPr marL="863751" algn="l" defTabSz="863751" rtl="0" eaLnBrk="1" latinLnBrk="0" hangingPunct="1">
+      <a:defRPr sz="1700" kern="1200">
         <a:solidFill>
           <a:schemeClr val="tx1"/>
         </a:solidFill>
@@ -43,8 +43,8 @@
         <a:cs typeface="+mn-cs"/>
       </a:defRPr>
     </a:lvl3pPr>
-    <a:lvl4pPr marL="1036498" algn="l" defTabSz="691001" rtl="0" eaLnBrk="1" latinLnBrk="0" hangingPunct="1">
-      <a:defRPr sz="1360" kern="1200">
+    <a:lvl4pPr marL="1295623" algn="l" defTabSz="863751" rtl="0" eaLnBrk="1" latinLnBrk="0" hangingPunct="1">
+      <a:defRPr sz="1700" kern="1200">
         <a:solidFill>
           <a:schemeClr val="tx1"/>
         </a:solidFill>
@@ -53,8 +53,8 @@
         <a:cs typeface="+mn-cs"/>
       </a:defRPr>
     </a:lvl4pPr>
-    <a:lvl5pPr marL="1381998" algn="l" defTabSz="691001" rtl="0" eaLnBrk="1" latinLnBrk="0" hangingPunct="1">
-      <a:defRPr sz="1360" kern="1200">
+    <a:lvl5pPr marL="1727498" algn="l" defTabSz="863751" rtl="0" eaLnBrk="1" latinLnBrk="0" hangingPunct="1">
+      <a:defRPr sz="1700" kern="1200">
         <a:solidFill>
           <a:schemeClr val="tx1"/>
         </a:solidFill>
@@ -63,8 +63,8 @@
         <a:cs typeface="+mn-cs"/>
       </a:defRPr>
     </a:lvl5pPr>
-    <a:lvl6pPr marL="1727498" algn="l" defTabSz="691001" rtl="0" eaLnBrk="1" latinLnBrk="0" hangingPunct="1">
-      <a:defRPr sz="1360" kern="1200">
+    <a:lvl6pPr marL="2159373" algn="l" defTabSz="863751" rtl="0" eaLnBrk="1" latinLnBrk="0" hangingPunct="1">
+      <a:defRPr sz="1700" kern="1200">
         <a:solidFill>
           <a:schemeClr val="tx1"/>
         </a:solidFill>
@@ -73,8 +73,8 @@
         <a:cs typeface="+mn-cs"/>
       </a:defRPr>
     </a:lvl6pPr>
-    <a:lvl7pPr marL="2072999" algn="l" defTabSz="691001" rtl="0" eaLnBrk="1" latinLnBrk="0" hangingPunct="1">
-      <a:defRPr sz="1360" kern="1200">
+    <a:lvl7pPr marL="2591249" algn="l" defTabSz="863751" rtl="0" eaLnBrk="1" latinLnBrk="0" hangingPunct="1">
+      <a:defRPr sz="1700" kern="1200">
         <a:solidFill>
           <a:schemeClr val="tx1"/>
         </a:solidFill>
@@ -83,8 +83,8 @@
         <a:cs typeface="+mn-cs"/>
       </a:defRPr>
     </a:lvl7pPr>
-    <a:lvl8pPr marL="2418500" algn="l" defTabSz="691001" rtl="0" eaLnBrk="1" latinLnBrk="0" hangingPunct="1">
-      <a:defRPr sz="1360" kern="1200">
+    <a:lvl8pPr marL="3023125" algn="l" defTabSz="863751" rtl="0" eaLnBrk="1" latinLnBrk="0" hangingPunct="1">
+      <a:defRPr sz="1700" kern="1200">
         <a:solidFill>
           <a:schemeClr val="tx1"/>
         </a:solidFill>
@@ -93,8 +93,8 @@
         <a:cs typeface="+mn-cs"/>
       </a:defRPr>
     </a:lvl8pPr>
-    <a:lvl9pPr marL="2763997" algn="l" defTabSz="691001" rtl="0" eaLnBrk="1" latinLnBrk="0" hangingPunct="1">
-      <a:defRPr sz="1360" kern="1200">
+    <a:lvl9pPr marL="3454996" algn="l" defTabSz="863751" rtl="0" eaLnBrk="1" latinLnBrk="0" hangingPunct="1">
+      <a:defRPr sz="1700" kern="1200">
         <a:solidFill>
           <a:schemeClr val="tx1"/>
         </a:solidFill>
@@ -141,15 +141,15 @@
         </p:nvSpPr>
         <p:spPr>
           <a:xfrm>
-            <a:off x="539949" y="1178222"/>
-            <a:ext cx="6119416" cy="2506427"/>
+            <a:off x="674966" y="1472842"/>
+            <a:ext cx="7649607" cy="3133172"/>
           </a:xfrm>
         </p:spPr>
         <p:txBody>
           <a:bodyPr anchor="b"/>
           <a:lstStyle>
             <a:lvl1pPr algn="ctr">
-              <a:defRPr sz="4724"/>
+              <a:defRPr sz="5905"/>
             </a:lvl1pPr>
           </a:lstStyle>
           <a:p>
@@ -173,8 +173,8 @@
         </p:nvSpPr>
         <p:spPr>
           <a:xfrm>
-            <a:off x="899914" y="3781306"/>
-            <a:ext cx="5399485" cy="1738167"/>
+            <a:off x="1124942" y="4726842"/>
+            <a:ext cx="6749654" cy="2172804"/>
           </a:xfrm>
         </p:spPr>
         <p:txBody>
@@ -182,39 +182,39 @@
           <a:lstStyle>
             <a:lvl1pPr marL="0" indent="0" algn="ctr">
               <a:buNone/>
-              <a:defRPr sz="1890"/>
+              <a:defRPr sz="2362"/>
             </a:lvl1pPr>
-            <a:lvl2pPr marL="359954" indent="0" algn="ctr">
+            <a:lvl2pPr marL="449976" indent="0" algn="ctr">
+              <a:buNone/>
+              <a:defRPr sz="1968"/>
+            </a:lvl2pPr>
+            <a:lvl3pPr marL="899952" indent="0" algn="ctr">
+              <a:buNone/>
+              <a:defRPr sz="1772"/>
+            </a:lvl3pPr>
+            <a:lvl4pPr marL="1349929" indent="0" algn="ctr">
               <a:buNone/>
               <a:defRPr sz="1575"/>
-            </a:lvl2pPr>
-            <a:lvl3pPr marL="719907" indent="0" algn="ctr">
-              <a:buNone/>
-              <a:defRPr sz="1417"/>
-            </a:lvl3pPr>
-            <a:lvl4pPr marL="1079861" indent="0" algn="ctr">
-              <a:buNone/>
-              <a:defRPr sz="1260"/>
             </a:lvl4pPr>
-            <a:lvl5pPr marL="1439814" indent="0" algn="ctr">
-              <a:buNone/>
-              <a:defRPr sz="1260"/>
+            <a:lvl5pPr marL="1799905" indent="0" algn="ctr">
+              <a:buNone/>
+              <a:defRPr sz="1575"/>
             </a:lvl5pPr>
-            <a:lvl6pPr marL="1799768" indent="0" algn="ctr">
-              <a:buNone/>
-              <a:defRPr sz="1260"/>
+            <a:lvl6pPr marL="2249881" indent="0" algn="ctr">
+              <a:buNone/>
+              <a:defRPr sz="1575"/>
             </a:lvl6pPr>
-            <a:lvl7pPr marL="2159721" indent="0" algn="ctr">
-              <a:buNone/>
-              <a:defRPr sz="1260"/>
+            <a:lvl7pPr marL="2699857" indent="0" algn="ctr">
+              <a:buNone/>
+              <a:defRPr sz="1575"/>
             </a:lvl7pPr>
-            <a:lvl8pPr marL="2519675" indent="0" algn="ctr">
-              <a:buNone/>
-              <a:defRPr sz="1260"/>
+            <a:lvl8pPr marL="3149834" indent="0" algn="ctr">
+              <a:buNone/>
+              <a:defRPr sz="1575"/>
             </a:lvl8pPr>
-            <a:lvl9pPr marL="2879628" indent="0" algn="ctr">
-              <a:buNone/>
-              <a:defRPr sz="1260"/>
+            <a:lvl9pPr marL="3599810" indent="0" algn="ctr">
+              <a:buNone/>
+              <a:defRPr sz="1575"/>
             </a:lvl9pPr>
           </a:lstStyle>
           <a:p>
@@ -294,7 +294,7 @@
     </p:spTree>
     <p:extLst>
       <p:ext uri="{BB962C8B-B14F-4D97-AF65-F5344CB8AC3E}">
-        <p14:creationId xmlns:p14="http://schemas.microsoft.com/office/powerpoint/2010/main" val="842107039"/>
+        <p14:creationId xmlns:p14="http://schemas.microsoft.com/office/powerpoint/2010/main" val="1709192064"/>
       </p:ext>
     </p:extLst>
   </p:cSld>
@@ -464,7 +464,7 @@
     </p:spTree>
     <p:extLst>
       <p:ext uri="{BB962C8B-B14F-4D97-AF65-F5344CB8AC3E}">
-        <p14:creationId xmlns:p14="http://schemas.microsoft.com/office/powerpoint/2010/main" val="138228187"/>
+        <p14:creationId xmlns:p14="http://schemas.microsoft.com/office/powerpoint/2010/main" val="3354924099"/>
       </p:ext>
     </p:extLst>
   </p:cSld>
@@ -503,8 +503,8 @@
         </p:nvSpPr>
         <p:spPr>
           <a:xfrm>
-            <a:off x="5152009" y="383297"/>
-            <a:ext cx="1552352" cy="6101085"/>
+            <a:off x="6440295" y="479142"/>
+            <a:ext cx="1940525" cy="7626692"/>
           </a:xfrm>
         </p:spPr>
         <p:txBody>
@@ -531,8 +531,8 @@
         </p:nvSpPr>
         <p:spPr>
           <a:xfrm>
-            <a:off x="494953" y="383297"/>
-            <a:ext cx="4567064" cy="6101085"/>
+            <a:off x="618719" y="479142"/>
+            <a:ext cx="5709082" cy="7626692"/>
           </a:xfrm>
         </p:spPr>
         <p:txBody>
@@ -644,7 +644,7 @@
     </p:spTree>
     <p:extLst>
       <p:ext uri="{BB962C8B-B14F-4D97-AF65-F5344CB8AC3E}">
-        <p14:creationId xmlns:p14="http://schemas.microsoft.com/office/powerpoint/2010/main" val="2111642587"/>
+        <p14:creationId xmlns:p14="http://schemas.microsoft.com/office/powerpoint/2010/main" val="2018591043"/>
       </p:ext>
     </p:extLst>
   </p:cSld>
@@ -814,7 +814,7 @@
     </p:spTree>
     <p:extLst>
       <p:ext uri="{BB962C8B-B14F-4D97-AF65-F5344CB8AC3E}">
-        <p14:creationId xmlns:p14="http://schemas.microsoft.com/office/powerpoint/2010/main" val="282894214"/>
+        <p14:creationId xmlns:p14="http://schemas.microsoft.com/office/powerpoint/2010/main" val="2474642428"/>
       </p:ext>
     </p:extLst>
   </p:cSld>
@@ -853,15 +853,15 @@
         </p:nvSpPr>
         <p:spPr>
           <a:xfrm>
-            <a:off x="491204" y="1794831"/>
-            <a:ext cx="6209407" cy="2994714"/>
+            <a:off x="614031" y="2243638"/>
+            <a:ext cx="7762102" cy="3743557"/>
           </a:xfrm>
         </p:spPr>
         <p:txBody>
           <a:bodyPr anchor="b"/>
           <a:lstStyle>
             <a:lvl1pPr>
-              <a:defRPr sz="4724"/>
+              <a:defRPr sz="5905"/>
             </a:lvl1pPr>
           </a:lstStyle>
           <a:p>
@@ -885,8 +885,8 @@
         </p:nvSpPr>
         <p:spPr>
           <a:xfrm>
-            <a:off x="491204" y="4817876"/>
-            <a:ext cx="6209407" cy="1574849"/>
+            <a:off x="614031" y="6022610"/>
+            <a:ext cx="7762102" cy="1968648"/>
           </a:xfrm>
         </p:spPr>
         <p:txBody>
@@ -894,13 +894,33 @@
           <a:lstStyle>
             <a:lvl1pPr marL="0" indent="0">
               <a:buNone/>
-              <a:defRPr sz="1890">
+              <a:defRPr sz="2362">
                 <a:solidFill>
                   <a:schemeClr val="tx1"/>
                 </a:solidFill>
               </a:defRPr>
             </a:lvl1pPr>
-            <a:lvl2pPr marL="359954" indent="0">
+            <a:lvl2pPr marL="449976" indent="0">
+              <a:buNone/>
+              <a:defRPr sz="1968">
+                <a:solidFill>
+                  <a:schemeClr val="tx1">
+                    <a:tint val="75000"/>
+                  </a:schemeClr>
+                </a:solidFill>
+              </a:defRPr>
+            </a:lvl2pPr>
+            <a:lvl3pPr marL="899952" indent="0">
+              <a:buNone/>
+              <a:defRPr sz="1772">
+                <a:solidFill>
+                  <a:schemeClr val="tx1">
+                    <a:tint val="75000"/>
+                  </a:schemeClr>
+                </a:solidFill>
+              </a:defRPr>
+            </a:lvl3pPr>
+            <a:lvl4pPr marL="1349929" indent="0">
               <a:buNone/>
               <a:defRPr sz="1575">
                 <a:solidFill>
@@ -909,30 +929,10 @@
                   </a:schemeClr>
                 </a:solidFill>
               </a:defRPr>
-            </a:lvl2pPr>
-            <a:lvl3pPr marL="719907" indent="0">
-              <a:buNone/>
-              <a:defRPr sz="1417">
-                <a:solidFill>
-                  <a:schemeClr val="tx1">
-                    <a:tint val="75000"/>
-                  </a:schemeClr>
-                </a:solidFill>
-              </a:defRPr>
-            </a:lvl3pPr>
-            <a:lvl4pPr marL="1079861" indent="0">
-              <a:buNone/>
-              <a:defRPr sz="1260">
-                <a:solidFill>
-                  <a:schemeClr val="tx1">
-                    <a:tint val="75000"/>
-                  </a:schemeClr>
-                </a:solidFill>
-              </a:defRPr>
             </a:lvl4pPr>
-            <a:lvl5pPr marL="1439814" indent="0">
-              <a:buNone/>
-              <a:defRPr sz="1260">
+            <a:lvl5pPr marL="1799905" indent="0">
+              <a:buNone/>
+              <a:defRPr sz="1575">
                 <a:solidFill>
                   <a:schemeClr val="tx1">
                     <a:tint val="75000"/>
@@ -940,9 +940,9 @@
                 </a:solidFill>
               </a:defRPr>
             </a:lvl5pPr>
-            <a:lvl6pPr marL="1799768" indent="0">
-              <a:buNone/>
-              <a:defRPr sz="1260">
+            <a:lvl6pPr marL="2249881" indent="0">
+              <a:buNone/>
+              <a:defRPr sz="1575">
                 <a:solidFill>
                   <a:schemeClr val="tx1">
                     <a:tint val="75000"/>
@@ -950,9 +950,9 @@
                 </a:solidFill>
               </a:defRPr>
             </a:lvl6pPr>
-            <a:lvl7pPr marL="2159721" indent="0">
-              <a:buNone/>
-              <a:defRPr sz="1260">
+            <a:lvl7pPr marL="2699857" indent="0">
+              <a:buNone/>
+              <a:defRPr sz="1575">
                 <a:solidFill>
                   <a:schemeClr val="tx1">
                     <a:tint val="75000"/>
@@ -960,9 +960,9 @@
                 </a:solidFill>
               </a:defRPr>
             </a:lvl7pPr>
-            <a:lvl8pPr marL="2519675" indent="0">
-              <a:buNone/>
-              <a:defRPr sz="1260">
+            <a:lvl8pPr marL="3149834" indent="0">
+              <a:buNone/>
+              <a:defRPr sz="1575">
                 <a:solidFill>
                   <a:schemeClr val="tx1">
                     <a:tint val="75000"/>
@@ -970,9 +970,9 @@
                 </a:solidFill>
               </a:defRPr>
             </a:lvl8pPr>
-            <a:lvl9pPr marL="2879628" indent="0">
-              <a:buNone/>
-              <a:defRPr sz="1260">
+            <a:lvl9pPr marL="3599810" indent="0">
+              <a:buNone/>
+              <a:defRPr sz="1575">
                 <a:solidFill>
                   <a:schemeClr val="tx1">
                     <a:tint val="75000"/>
@@ -1058,7 +1058,7 @@
     </p:spTree>
     <p:extLst>
       <p:ext uri="{BB962C8B-B14F-4D97-AF65-F5344CB8AC3E}">
-        <p14:creationId xmlns:p14="http://schemas.microsoft.com/office/powerpoint/2010/main" val="401528604"/>
+        <p14:creationId xmlns:p14="http://schemas.microsoft.com/office/powerpoint/2010/main" val="2387581068"/>
       </p:ext>
     </p:extLst>
   </p:cSld>
@@ -1120,8 +1120,8 @@
         </p:nvSpPr>
         <p:spPr>
           <a:xfrm>
-            <a:off x="494953" y="1916484"/>
-            <a:ext cx="3059708" cy="4567898"/>
+            <a:off x="618718" y="2395710"/>
+            <a:ext cx="3824804" cy="5710124"/>
           </a:xfrm>
         </p:spPr>
         <p:txBody>
@@ -1177,8 +1177,8 @@
         </p:nvSpPr>
         <p:spPr>
           <a:xfrm>
-            <a:off x="3644652" y="1916484"/>
-            <a:ext cx="3059708" cy="4567898"/>
+            <a:off x="4556016" y="2395710"/>
+            <a:ext cx="3824804" cy="5710124"/>
           </a:xfrm>
         </p:spPr>
         <p:txBody>
@@ -1290,7 +1290,7 @@
     </p:spTree>
     <p:extLst>
       <p:ext uri="{BB962C8B-B14F-4D97-AF65-F5344CB8AC3E}">
-        <p14:creationId xmlns:p14="http://schemas.microsoft.com/office/powerpoint/2010/main" val="2504725679"/>
+        <p14:creationId xmlns:p14="http://schemas.microsoft.com/office/powerpoint/2010/main" val="1721259378"/>
       </p:ext>
     </p:extLst>
   </p:cSld>
@@ -1329,8 +1329,8 @@
         </p:nvSpPr>
         <p:spPr>
           <a:xfrm>
-            <a:off x="495891" y="383299"/>
-            <a:ext cx="6209407" cy="1391534"/>
+            <a:off x="619890" y="479144"/>
+            <a:ext cx="7762102" cy="1739495"/>
           </a:xfrm>
         </p:spPr>
         <p:txBody>
@@ -1357,8 +1357,8 @@
         </p:nvSpPr>
         <p:spPr>
           <a:xfrm>
-            <a:off x="495891" y="1764832"/>
-            <a:ext cx="3045646" cy="864917"/>
+            <a:off x="619891" y="2206137"/>
+            <a:ext cx="3807226" cy="1081194"/>
           </a:xfrm>
         </p:spPr>
         <p:txBody>
@@ -1366,39 +1366,39 @@
           <a:lstStyle>
             <a:lvl1pPr marL="0" indent="0">
               <a:buNone/>
-              <a:defRPr sz="1890" b="1"/>
+              <a:defRPr sz="2362" b="1"/>
             </a:lvl1pPr>
-            <a:lvl2pPr marL="359954" indent="0">
+            <a:lvl2pPr marL="449976" indent="0">
+              <a:buNone/>
+              <a:defRPr sz="1968" b="1"/>
+            </a:lvl2pPr>
+            <a:lvl3pPr marL="899952" indent="0">
+              <a:buNone/>
+              <a:defRPr sz="1772" b="1"/>
+            </a:lvl3pPr>
+            <a:lvl4pPr marL="1349929" indent="0">
               <a:buNone/>
               <a:defRPr sz="1575" b="1"/>
-            </a:lvl2pPr>
-            <a:lvl3pPr marL="719907" indent="0">
-              <a:buNone/>
-              <a:defRPr sz="1417" b="1"/>
-            </a:lvl3pPr>
-            <a:lvl4pPr marL="1079861" indent="0">
-              <a:buNone/>
-              <a:defRPr sz="1260" b="1"/>
             </a:lvl4pPr>
-            <a:lvl5pPr marL="1439814" indent="0">
-              <a:buNone/>
-              <a:defRPr sz="1260" b="1"/>
+            <a:lvl5pPr marL="1799905" indent="0">
+              <a:buNone/>
+              <a:defRPr sz="1575" b="1"/>
             </a:lvl5pPr>
-            <a:lvl6pPr marL="1799768" indent="0">
-              <a:buNone/>
-              <a:defRPr sz="1260" b="1"/>
+            <a:lvl6pPr marL="2249881" indent="0">
+              <a:buNone/>
+              <a:defRPr sz="1575" b="1"/>
             </a:lvl6pPr>
-            <a:lvl7pPr marL="2159721" indent="0">
-              <a:buNone/>
-              <a:defRPr sz="1260" b="1"/>
+            <a:lvl7pPr marL="2699857" indent="0">
+              <a:buNone/>
+              <a:defRPr sz="1575" b="1"/>
             </a:lvl7pPr>
-            <a:lvl8pPr marL="2519675" indent="0">
-              <a:buNone/>
-              <a:defRPr sz="1260" b="1"/>
+            <a:lvl8pPr marL="3149834" indent="0">
+              <a:buNone/>
+              <a:defRPr sz="1575" b="1"/>
             </a:lvl8pPr>
-            <a:lvl9pPr marL="2879628" indent="0">
-              <a:buNone/>
-              <a:defRPr sz="1260" b="1"/>
+            <a:lvl9pPr marL="3599810" indent="0">
+              <a:buNone/>
+              <a:defRPr sz="1575" b="1"/>
             </a:lvl9pPr>
           </a:lstStyle>
           <a:p>
@@ -1422,8 +1422,8 @@
         </p:nvSpPr>
         <p:spPr>
           <a:xfrm>
-            <a:off x="495891" y="2629749"/>
-            <a:ext cx="3045646" cy="3867965"/>
+            <a:off x="619891" y="3287331"/>
+            <a:ext cx="3807226" cy="4835169"/>
           </a:xfrm>
         </p:spPr>
         <p:txBody>
@@ -1479,8 +1479,8 @@
         </p:nvSpPr>
         <p:spPr>
           <a:xfrm>
-            <a:off x="3644652" y="1764832"/>
-            <a:ext cx="3060646" cy="864917"/>
+            <a:off x="4556017" y="2206137"/>
+            <a:ext cx="3825976" cy="1081194"/>
           </a:xfrm>
         </p:spPr>
         <p:txBody>
@@ -1488,39 +1488,39 @@
           <a:lstStyle>
             <a:lvl1pPr marL="0" indent="0">
               <a:buNone/>
-              <a:defRPr sz="1890" b="1"/>
+              <a:defRPr sz="2362" b="1"/>
             </a:lvl1pPr>
-            <a:lvl2pPr marL="359954" indent="0">
+            <a:lvl2pPr marL="449976" indent="0">
+              <a:buNone/>
+              <a:defRPr sz="1968" b="1"/>
+            </a:lvl2pPr>
+            <a:lvl3pPr marL="899952" indent="0">
+              <a:buNone/>
+              <a:defRPr sz="1772" b="1"/>
+            </a:lvl3pPr>
+            <a:lvl4pPr marL="1349929" indent="0">
               <a:buNone/>
               <a:defRPr sz="1575" b="1"/>
-            </a:lvl2pPr>
-            <a:lvl3pPr marL="719907" indent="0">
-              <a:buNone/>
-              <a:defRPr sz="1417" b="1"/>
-            </a:lvl3pPr>
-            <a:lvl4pPr marL="1079861" indent="0">
-              <a:buNone/>
-              <a:defRPr sz="1260" b="1"/>
             </a:lvl4pPr>
-            <a:lvl5pPr marL="1439814" indent="0">
-              <a:buNone/>
-              <a:defRPr sz="1260" b="1"/>
+            <a:lvl5pPr marL="1799905" indent="0">
+              <a:buNone/>
+              <a:defRPr sz="1575" b="1"/>
             </a:lvl5pPr>
-            <a:lvl6pPr marL="1799768" indent="0">
-              <a:buNone/>
-              <a:defRPr sz="1260" b="1"/>
+            <a:lvl6pPr marL="2249881" indent="0">
+              <a:buNone/>
+              <a:defRPr sz="1575" b="1"/>
             </a:lvl6pPr>
-            <a:lvl7pPr marL="2159721" indent="0">
-              <a:buNone/>
-              <a:defRPr sz="1260" b="1"/>
+            <a:lvl7pPr marL="2699857" indent="0">
+              <a:buNone/>
+              <a:defRPr sz="1575" b="1"/>
             </a:lvl7pPr>
-            <a:lvl8pPr marL="2519675" indent="0">
-              <a:buNone/>
-              <a:defRPr sz="1260" b="1"/>
+            <a:lvl8pPr marL="3149834" indent="0">
+              <a:buNone/>
+              <a:defRPr sz="1575" b="1"/>
             </a:lvl8pPr>
-            <a:lvl9pPr marL="2879628" indent="0">
-              <a:buNone/>
-              <a:defRPr sz="1260" b="1"/>
+            <a:lvl9pPr marL="3599810" indent="0">
+              <a:buNone/>
+              <a:defRPr sz="1575" b="1"/>
             </a:lvl9pPr>
           </a:lstStyle>
           <a:p>
@@ -1544,8 +1544,8 @@
         </p:nvSpPr>
         <p:spPr>
           <a:xfrm>
-            <a:off x="3644652" y="2629749"/>
-            <a:ext cx="3060646" cy="3867965"/>
+            <a:off x="4556017" y="3287331"/>
+            <a:ext cx="3825976" cy="4835169"/>
           </a:xfrm>
         </p:spPr>
         <p:txBody>
@@ -1657,7 +1657,7 @@
     </p:spTree>
     <p:extLst>
       <p:ext uri="{BB962C8B-B14F-4D97-AF65-F5344CB8AC3E}">
-        <p14:creationId xmlns:p14="http://schemas.microsoft.com/office/powerpoint/2010/main" val="2295218917"/>
+        <p14:creationId xmlns:p14="http://schemas.microsoft.com/office/powerpoint/2010/main" val="180250511"/>
       </p:ext>
     </p:extLst>
   </p:cSld>
@@ -1775,7 +1775,7 @@
     </p:spTree>
     <p:extLst>
       <p:ext uri="{BB962C8B-B14F-4D97-AF65-F5344CB8AC3E}">
-        <p14:creationId xmlns:p14="http://schemas.microsoft.com/office/powerpoint/2010/main" val="1075479317"/>
+        <p14:creationId xmlns:p14="http://schemas.microsoft.com/office/powerpoint/2010/main" val="2557870645"/>
       </p:ext>
     </p:extLst>
   </p:cSld>
@@ -1870,7 +1870,7 @@
     </p:spTree>
     <p:extLst>
       <p:ext uri="{BB962C8B-B14F-4D97-AF65-F5344CB8AC3E}">
-        <p14:creationId xmlns:p14="http://schemas.microsoft.com/office/powerpoint/2010/main" val="4209055559"/>
+        <p14:creationId xmlns:p14="http://schemas.microsoft.com/office/powerpoint/2010/main" val="590345757"/>
       </p:ext>
     </p:extLst>
   </p:cSld>
@@ -1909,15 +1909,15 @@
         </p:nvSpPr>
         <p:spPr>
           <a:xfrm>
-            <a:off x="495890" y="479954"/>
-            <a:ext cx="2321966" cy="1679840"/>
+            <a:off x="619891" y="599969"/>
+            <a:ext cx="2902585" cy="2099892"/>
           </a:xfrm>
         </p:spPr>
         <p:txBody>
           <a:bodyPr anchor="b"/>
           <a:lstStyle>
             <a:lvl1pPr>
-              <a:defRPr sz="2519"/>
+              <a:defRPr sz="3149"/>
             </a:lvl1pPr>
           </a:lstStyle>
           <a:p>
@@ -1941,39 +1941,39 @@
         </p:nvSpPr>
         <p:spPr>
           <a:xfrm>
-            <a:off x="3060646" y="1036570"/>
-            <a:ext cx="3644652" cy="5116178"/>
+            <a:off x="3825976" y="1295769"/>
+            <a:ext cx="4556016" cy="6395505"/>
           </a:xfrm>
         </p:spPr>
         <p:txBody>
           <a:bodyPr/>
           <a:lstStyle>
             <a:lvl1pPr>
-              <a:defRPr sz="2519"/>
+              <a:defRPr sz="3149"/>
             </a:lvl1pPr>
             <a:lvl2pPr>
-              <a:defRPr sz="2204"/>
+              <a:defRPr sz="2756"/>
             </a:lvl2pPr>
             <a:lvl3pPr>
-              <a:defRPr sz="1890"/>
+              <a:defRPr sz="2362"/>
             </a:lvl3pPr>
             <a:lvl4pPr>
-              <a:defRPr sz="1575"/>
+              <a:defRPr sz="1968"/>
             </a:lvl4pPr>
             <a:lvl5pPr>
-              <a:defRPr sz="1575"/>
+              <a:defRPr sz="1968"/>
             </a:lvl5pPr>
             <a:lvl6pPr>
-              <a:defRPr sz="1575"/>
+              <a:defRPr sz="1968"/>
             </a:lvl6pPr>
             <a:lvl7pPr>
-              <a:defRPr sz="1575"/>
+              <a:defRPr sz="1968"/>
             </a:lvl7pPr>
             <a:lvl8pPr>
-              <a:defRPr sz="1575"/>
+              <a:defRPr sz="1968"/>
             </a:lvl8pPr>
             <a:lvl9pPr>
-              <a:defRPr sz="1575"/>
+              <a:defRPr sz="1968"/>
             </a:lvl9pPr>
           </a:lstStyle>
           <a:p>
@@ -2026,8 +2026,8 @@
         </p:nvSpPr>
         <p:spPr>
           <a:xfrm>
-            <a:off x="495890" y="2159794"/>
-            <a:ext cx="2321966" cy="4001285"/>
+            <a:off x="619891" y="2699862"/>
+            <a:ext cx="2902585" cy="5001827"/>
           </a:xfrm>
         </p:spPr>
         <p:txBody>
@@ -2035,39 +2035,39 @@
           <a:lstStyle>
             <a:lvl1pPr marL="0" indent="0">
               <a:buNone/>
-              <a:defRPr sz="1260"/>
+              <a:defRPr sz="1575"/>
             </a:lvl1pPr>
-            <a:lvl2pPr marL="359954" indent="0">
-              <a:buNone/>
-              <a:defRPr sz="1102"/>
+            <a:lvl2pPr marL="449976" indent="0">
+              <a:buNone/>
+              <a:defRPr sz="1378"/>
             </a:lvl2pPr>
-            <a:lvl3pPr marL="719907" indent="0">
-              <a:buNone/>
-              <a:defRPr sz="945"/>
+            <a:lvl3pPr marL="899952" indent="0">
+              <a:buNone/>
+              <a:defRPr sz="1181"/>
             </a:lvl3pPr>
-            <a:lvl4pPr marL="1079861" indent="0">
-              <a:buNone/>
-              <a:defRPr sz="787"/>
+            <a:lvl4pPr marL="1349929" indent="0">
+              <a:buNone/>
+              <a:defRPr sz="984"/>
             </a:lvl4pPr>
-            <a:lvl5pPr marL="1439814" indent="0">
-              <a:buNone/>
-              <a:defRPr sz="787"/>
+            <a:lvl5pPr marL="1799905" indent="0">
+              <a:buNone/>
+              <a:defRPr sz="984"/>
             </a:lvl5pPr>
-            <a:lvl6pPr marL="1799768" indent="0">
-              <a:buNone/>
-              <a:defRPr sz="787"/>
+            <a:lvl6pPr marL="2249881" indent="0">
+              <a:buNone/>
+              <a:defRPr sz="984"/>
             </a:lvl6pPr>
-            <a:lvl7pPr marL="2159721" indent="0">
-              <a:buNone/>
-              <a:defRPr sz="787"/>
+            <a:lvl7pPr marL="2699857" indent="0">
+              <a:buNone/>
+              <a:defRPr sz="984"/>
             </a:lvl7pPr>
-            <a:lvl8pPr marL="2519675" indent="0">
-              <a:buNone/>
-              <a:defRPr sz="787"/>
+            <a:lvl8pPr marL="3149834" indent="0">
+              <a:buNone/>
+              <a:defRPr sz="984"/>
             </a:lvl8pPr>
-            <a:lvl9pPr marL="2879628" indent="0">
-              <a:buNone/>
-              <a:defRPr sz="787"/>
+            <a:lvl9pPr marL="3599810" indent="0">
+              <a:buNone/>
+              <a:defRPr sz="984"/>
             </a:lvl9pPr>
           </a:lstStyle>
           <a:p>
@@ -2147,7 +2147,7 @@
     </p:spTree>
     <p:extLst>
       <p:ext uri="{BB962C8B-B14F-4D97-AF65-F5344CB8AC3E}">
-        <p14:creationId xmlns:p14="http://schemas.microsoft.com/office/powerpoint/2010/main" val="4233105207"/>
+        <p14:creationId xmlns:p14="http://schemas.microsoft.com/office/powerpoint/2010/main" val="3850784144"/>
       </p:ext>
     </p:extLst>
   </p:cSld>
@@ -2186,15 +2186,15 @@
         </p:nvSpPr>
         <p:spPr>
           <a:xfrm>
-            <a:off x="495890" y="479954"/>
-            <a:ext cx="2321966" cy="1679840"/>
+            <a:off x="619891" y="599969"/>
+            <a:ext cx="2902585" cy="2099892"/>
           </a:xfrm>
         </p:spPr>
         <p:txBody>
           <a:bodyPr anchor="b"/>
           <a:lstStyle>
             <a:lvl1pPr>
-              <a:defRPr sz="2519"/>
+              <a:defRPr sz="3149"/>
             </a:lvl1pPr>
           </a:lstStyle>
           <a:p>
@@ -2218,8 +2218,8 @@
         </p:nvSpPr>
         <p:spPr>
           <a:xfrm>
-            <a:off x="3060646" y="1036570"/>
-            <a:ext cx="3644652" cy="5116178"/>
+            <a:off x="3825976" y="1295769"/>
+            <a:ext cx="4556016" cy="6395505"/>
           </a:xfrm>
         </p:spPr>
         <p:txBody>
@@ -2227,39 +2227,39 @@
           <a:lstStyle>
             <a:lvl1pPr marL="0" indent="0">
               <a:buNone/>
-              <a:defRPr sz="2519"/>
+              <a:defRPr sz="3149"/>
             </a:lvl1pPr>
-            <a:lvl2pPr marL="359954" indent="0">
-              <a:buNone/>
-              <a:defRPr sz="2204"/>
+            <a:lvl2pPr marL="449976" indent="0">
+              <a:buNone/>
+              <a:defRPr sz="2756"/>
             </a:lvl2pPr>
-            <a:lvl3pPr marL="719907" indent="0">
-              <a:buNone/>
-              <a:defRPr sz="1890"/>
+            <a:lvl3pPr marL="899952" indent="0">
+              <a:buNone/>
+              <a:defRPr sz="2362"/>
             </a:lvl3pPr>
-            <a:lvl4pPr marL="1079861" indent="0">
-              <a:buNone/>
-              <a:defRPr sz="1575"/>
+            <a:lvl4pPr marL="1349929" indent="0">
+              <a:buNone/>
+              <a:defRPr sz="1968"/>
             </a:lvl4pPr>
-            <a:lvl5pPr marL="1439814" indent="0">
-              <a:buNone/>
-              <a:defRPr sz="1575"/>
+            <a:lvl5pPr marL="1799905" indent="0">
+              <a:buNone/>
+              <a:defRPr sz="1968"/>
             </a:lvl5pPr>
-            <a:lvl6pPr marL="1799768" indent="0">
-              <a:buNone/>
-              <a:defRPr sz="1575"/>
+            <a:lvl6pPr marL="2249881" indent="0">
+              <a:buNone/>
+              <a:defRPr sz="1968"/>
             </a:lvl6pPr>
-            <a:lvl7pPr marL="2159721" indent="0">
-              <a:buNone/>
-              <a:defRPr sz="1575"/>
+            <a:lvl7pPr marL="2699857" indent="0">
+              <a:buNone/>
+              <a:defRPr sz="1968"/>
             </a:lvl7pPr>
-            <a:lvl8pPr marL="2519675" indent="0">
-              <a:buNone/>
-              <a:defRPr sz="1575"/>
+            <a:lvl8pPr marL="3149834" indent="0">
+              <a:buNone/>
+              <a:defRPr sz="1968"/>
             </a:lvl8pPr>
-            <a:lvl9pPr marL="2879628" indent="0">
-              <a:buNone/>
-              <a:defRPr sz="1575"/>
+            <a:lvl9pPr marL="3599810" indent="0">
+              <a:buNone/>
+              <a:defRPr sz="1968"/>
             </a:lvl9pPr>
           </a:lstStyle>
           <a:p>
@@ -2283,8 +2283,8 @@
         </p:nvSpPr>
         <p:spPr>
           <a:xfrm>
-            <a:off x="495890" y="2159794"/>
-            <a:ext cx="2321966" cy="4001285"/>
+            <a:off x="619891" y="2699862"/>
+            <a:ext cx="2902585" cy="5001827"/>
           </a:xfrm>
         </p:spPr>
         <p:txBody>
@@ -2292,39 +2292,39 @@
           <a:lstStyle>
             <a:lvl1pPr marL="0" indent="0">
               <a:buNone/>
-              <a:defRPr sz="1260"/>
+              <a:defRPr sz="1575"/>
             </a:lvl1pPr>
-            <a:lvl2pPr marL="359954" indent="0">
-              <a:buNone/>
-              <a:defRPr sz="1102"/>
+            <a:lvl2pPr marL="449976" indent="0">
+              <a:buNone/>
+              <a:defRPr sz="1378"/>
             </a:lvl2pPr>
-            <a:lvl3pPr marL="719907" indent="0">
-              <a:buNone/>
-              <a:defRPr sz="945"/>
+            <a:lvl3pPr marL="899952" indent="0">
+              <a:buNone/>
+              <a:defRPr sz="1181"/>
             </a:lvl3pPr>
-            <a:lvl4pPr marL="1079861" indent="0">
-              <a:buNone/>
-              <a:defRPr sz="787"/>
+            <a:lvl4pPr marL="1349929" indent="0">
+              <a:buNone/>
+              <a:defRPr sz="984"/>
             </a:lvl4pPr>
-            <a:lvl5pPr marL="1439814" indent="0">
-              <a:buNone/>
-              <a:defRPr sz="787"/>
+            <a:lvl5pPr marL="1799905" indent="0">
+              <a:buNone/>
+              <a:defRPr sz="984"/>
             </a:lvl5pPr>
-            <a:lvl6pPr marL="1799768" indent="0">
-              <a:buNone/>
-              <a:defRPr sz="787"/>
+            <a:lvl6pPr marL="2249881" indent="0">
+              <a:buNone/>
+              <a:defRPr sz="984"/>
             </a:lvl6pPr>
-            <a:lvl7pPr marL="2159721" indent="0">
-              <a:buNone/>
-              <a:defRPr sz="787"/>
+            <a:lvl7pPr marL="2699857" indent="0">
+              <a:buNone/>
+              <a:defRPr sz="984"/>
             </a:lvl7pPr>
-            <a:lvl8pPr marL="2519675" indent="0">
-              <a:buNone/>
-              <a:defRPr sz="787"/>
+            <a:lvl8pPr marL="3149834" indent="0">
+              <a:buNone/>
+              <a:defRPr sz="984"/>
             </a:lvl8pPr>
-            <a:lvl9pPr marL="2879628" indent="0">
-              <a:buNone/>
-              <a:defRPr sz="787"/>
+            <a:lvl9pPr marL="3599810" indent="0">
+              <a:buNone/>
+              <a:defRPr sz="984"/>
             </a:lvl9pPr>
           </a:lstStyle>
           <a:p>
@@ -2404,7 +2404,7 @@
     </p:spTree>
     <p:extLst>
       <p:ext uri="{BB962C8B-B14F-4D97-AF65-F5344CB8AC3E}">
-        <p14:creationId xmlns:p14="http://schemas.microsoft.com/office/powerpoint/2010/main" val="3652643090"/>
+        <p14:creationId xmlns:p14="http://schemas.microsoft.com/office/powerpoint/2010/main" val="2706570782"/>
       </p:ext>
     </p:extLst>
   </p:cSld>
@@ -2448,8 +2448,8 @@
         </p:nvSpPr>
         <p:spPr>
           <a:xfrm>
-            <a:off x="494953" y="383299"/>
-            <a:ext cx="6209407" cy="1391534"/>
+            <a:off x="618718" y="479144"/>
+            <a:ext cx="7762102" cy="1739495"/>
           </a:xfrm>
           <a:prstGeom prst="rect">
             <a:avLst/>
@@ -2481,8 +2481,8 @@
         </p:nvSpPr>
         <p:spPr>
           <a:xfrm>
-            <a:off x="494953" y="1916484"/>
-            <a:ext cx="6209407" cy="4567898"/>
+            <a:off x="618718" y="2395710"/>
+            <a:ext cx="7762102" cy="5710124"/>
           </a:xfrm>
           <a:prstGeom prst="rect">
             <a:avLst/>
@@ -2543,8 +2543,8 @@
         </p:nvSpPr>
         <p:spPr>
           <a:xfrm>
-            <a:off x="494953" y="6672698"/>
-            <a:ext cx="1619845" cy="383297"/>
+            <a:off x="618718" y="8341240"/>
+            <a:ext cx="2024896" cy="479142"/>
           </a:xfrm>
           <a:prstGeom prst="rect">
             <a:avLst/>
@@ -2554,7 +2554,7 @@
           <a:bodyPr vert="horz" lIns="91440" tIns="45720" rIns="91440" bIns="45720" rtlCol="0" anchor="ctr"/>
           <a:lstStyle>
             <a:lvl1pPr algn="l">
-              <a:defRPr sz="945">
+              <a:defRPr sz="1181">
                 <a:solidFill>
                   <a:schemeClr val="tx1">
                     <a:tint val="75000"/>
@@ -2584,8 +2584,8 @@
         </p:nvSpPr>
         <p:spPr>
           <a:xfrm>
-            <a:off x="2384773" y="6672698"/>
-            <a:ext cx="2429768" cy="383297"/>
+            <a:off x="2981097" y="8341240"/>
+            <a:ext cx="3037344" cy="479142"/>
           </a:xfrm>
           <a:prstGeom prst="rect">
             <a:avLst/>
@@ -2595,7 +2595,7 @@
           <a:bodyPr vert="horz" lIns="91440" tIns="45720" rIns="91440" bIns="45720" rtlCol="0" anchor="ctr"/>
           <a:lstStyle>
             <a:lvl1pPr algn="ctr">
-              <a:defRPr sz="945">
+              <a:defRPr sz="1181">
                 <a:solidFill>
                   <a:schemeClr val="tx1">
                     <a:tint val="75000"/>
@@ -2621,8 +2621,8 @@
         </p:nvSpPr>
         <p:spPr>
           <a:xfrm>
-            <a:off x="5084515" y="6672698"/>
-            <a:ext cx="1619845" cy="383297"/>
+            <a:off x="6355924" y="8341240"/>
+            <a:ext cx="2024896" cy="479142"/>
           </a:xfrm>
           <a:prstGeom prst="rect">
             <a:avLst/>
@@ -2632,7 +2632,7 @@
           <a:bodyPr vert="horz" lIns="91440" tIns="45720" rIns="91440" bIns="45720" rtlCol="0" anchor="ctr"/>
           <a:lstStyle>
             <a:lvl1pPr algn="r">
-              <a:defRPr sz="945">
+              <a:defRPr sz="1181">
                 <a:solidFill>
                   <a:schemeClr val="tx1">
                     <a:tint val="75000"/>
@@ -2653,27 +2653,27 @@
     </p:spTree>
     <p:extLst>
       <p:ext uri="{BB962C8B-B14F-4D97-AF65-F5344CB8AC3E}">
-        <p14:creationId xmlns:p14="http://schemas.microsoft.com/office/powerpoint/2010/main" val="3984864076"/>
+        <p14:creationId xmlns:p14="http://schemas.microsoft.com/office/powerpoint/2010/main" val="3089234573"/>
       </p:ext>
     </p:extLst>
   </p:cSld>
   <p:clrMap bg1="lt1" tx1="dk1" bg2="lt2" tx2="dk2" accent1="accent1" accent2="accent2" accent3="accent3" accent4="accent4" accent5="accent5" accent6="accent6" hlink="hlink" folHlink="folHlink"/>
   <p:sldLayoutIdLst>
-    <p:sldLayoutId id="2147483697" r:id="rId1"/>
-    <p:sldLayoutId id="2147483698" r:id="rId2"/>
-    <p:sldLayoutId id="2147483699" r:id="rId3"/>
-    <p:sldLayoutId id="2147483700" r:id="rId4"/>
-    <p:sldLayoutId id="2147483701" r:id="rId5"/>
-    <p:sldLayoutId id="2147483702" r:id="rId6"/>
-    <p:sldLayoutId id="2147483703" r:id="rId7"/>
-    <p:sldLayoutId id="2147483704" r:id="rId8"/>
-    <p:sldLayoutId id="2147483705" r:id="rId9"/>
-    <p:sldLayoutId id="2147483706" r:id="rId10"/>
-    <p:sldLayoutId id="2147483707" r:id="rId11"/>
+    <p:sldLayoutId id="2147483709" r:id="rId1"/>
+    <p:sldLayoutId id="2147483710" r:id="rId2"/>
+    <p:sldLayoutId id="2147483711" r:id="rId3"/>
+    <p:sldLayoutId id="2147483712" r:id="rId4"/>
+    <p:sldLayoutId id="2147483713" r:id="rId5"/>
+    <p:sldLayoutId id="2147483714" r:id="rId6"/>
+    <p:sldLayoutId id="2147483715" r:id="rId7"/>
+    <p:sldLayoutId id="2147483716" r:id="rId8"/>
+    <p:sldLayoutId id="2147483717" r:id="rId9"/>
+    <p:sldLayoutId id="2147483718" r:id="rId10"/>
+    <p:sldLayoutId id="2147483719" r:id="rId11"/>
   </p:sldLayoutIdLst>
   <p:txStyles>
     <p:titleStyle>
-      <a:lvl1pPr algn="l" defTabSz="719907" rtl="0" eaLnBrk="1" latinLnBrk="0" hangingPunct="1">
+      <a:lvl1pPr algn="l" defTabSz="899952" rtl="0" eaLnBrk="1" latinLnBrk="0" hangingPunct="1">
         <a:lnSpc>
           <a:spcPct val="90000"/>
         </a:lnSpc>
@@ -2681,7 +2681,7 @@
           <a:spcPct val="0"/>
         </a:spcBef>
         <a:buNone/>
-        <a:defRPr sz="3464" kern="1200">
+        <a:defRPr sz="4330" kern="1200">
           <a:solidFill>
             <a:schemeClr val="tx1"/>
           </a:solidFill>
@@ -2692,16 +2692,16 @@
       </a:lvl1pPr>
     </p:titleStyle>
     <p:bodyStyle>
-      <a:lvl1pPr marL="179977" indent="-179977" algn="l" defTabSz="719907" rtl="0" eaLnBrk="1" latinLnBrk="0" hangingPunct="1">
+      <a:lvl1pPr marL="224988" indent="-224988" algn="l" defTabSz="899952" rtl="0" eaLnBrk="1" latinLnBrk="0" hangingPunct="1">
         <a:lnSpc>
           <a:spcPct val="90000"/>
         </a:lnSpc>
         <a:spcBef>
-          <a:spcPts val="787"/>
+          <a:spcPts val="984"/>
         </a:spcBef>
         <a:buFont typeface="Arial" panose="020B0604020202020204" pitchFamily="34" charset="0"/>
         <a:buChar char="•"/>
-        <a:defRPr sz="2204" kern="1200">
+        <a:defRPr sz="2756" kern="1200">
           <a:solidFill>
             <a:schemeClr val="tx1"/>
           </a:solidFill>
@@ -2710,16 +2710,16 @@
           <a:cs typeface="+mn-cs"/>
         </a:defRPr>
       </a:lvl1pPr>
-      <a:lvl2pPr marL="539930" indent="-179977" algn="l" defTabSz="719907" rtl="0" eaLnBrk="1" latinLnBrk="0" hangingPunct="1">
+      <a:lvl2pPr marL="674964" indent="-224988" algn="l" defTabSz="899952" rtl="0" eaLnBrk="1" latinLnBrk="0" hangingPunct="1">
         <a:lnSpc>
           <a:spcPct val="90000"/>
         </a:lnSpc>
         <a:spcBef>
-          <a:spcPts val="394"/>
+          <a:spcPts val="492"/>
         </a:spcBef>
         <a:buFont typeface="Arial" panose="020B0604020202020204" pitchFamily="34" charset="0"/>
         <a:buChar char="•"/>
-        <a:defRPr sz="1890" kern="1200">
+        <a:defRPr sz="2362" kern="1200">
           <a:solidFill>
             <a:schemeClr val="tx1"/>
           </a:solidFill>
@@ -2728,16 +2728,16 @@
           <a:cs typeface="+mn-cs"/>
         </a:defRPr>
       </a:lvl2pPr>
-      <a:lvl3pPr marL="899884" indent="-179977" algn="l" defTabSz="719907" rtl="0" eaLnBrk="1" latinLnBrk="0" hangingPunct="1">
+      <a:lvl3pPr marL="1124941" indent="-224988" algn="l" defTabSz="899952" rtl="0" eaLnBrk="1" latinLnBrk="0" hangingPunct="1">
         <a:lnSpc>
           <a:spcPct val="90000"/>
         </a:lnSpc>
         <a:spcBef>
-          <a:spcPts val="394"/>
+          <a:spcPts val="492"/>
         </a:spcBef>
         <a:buFont typeface="Arial" panose="020B0604020202020204" pitchFamily="34" charset="0"/>
         <a:buChar char="•"/>
-        <a:defRPr sz="1575" kern="1200">
+        <a:defRPr sz="1968" kern="1200">
           <a:solidFill>
             <a:schemeClr val="tx1"/>
           </a:solidFill>
@@ -2746,16 +2746,16 @@
           <a:cs typeface="+mn-cs"/>
         </a:defRPr>
       </a:lvl3pPr>
-      <a:lvl4pPr marL="1259837" indent="-179977" algn="l" defTabSz="719907" rtl="0" eaLnBrk="1" latinLnBrk="0" hangingPunct="1">
+      <a:lvl4pPr marL="1574917" indent="-224988" algn="l" defTabSz="899952" rtl="0" eaLnBrk="1" latinLnBrk="0" hangingPunct="1">
         <a:lnSpc>
           <a:spcPct val="90000"/>
         </a:lnSpc>
         <a:spcBef>
-          <a:spcPts val="394"/>
+          <a:spcPts val="492"/>
         </a:spcBef>
         <a:buFont typeface="Arial" panose="020B0604020202020204" pitchFamily="34" charset="0"/>
         <a:buChar char="•"/>
-        <a:defRPr sz="1417" kern="1200">
+        <a:defRPr sz="1772" kern="1200">
           <a:solidFill>
             <a:schemeClr val="tx1"/>
           </a:solidFill>
@@ -2764,16 +2764,16 @@
           <a:cs typeface="+mn-cs"/>
         </a:defRPr>
       </a:lvl4pPr>
-      <a:lvl5pPr marL="1619791" indent="-179977" algn="l" defTabSz="719907" rtl="0" eaLnBrk="1" latinLnBrk="0" hangingPunct="1">
+      <a:lvl5pPr marL="2024893" indent="-224988" algn="l" defTabSz="899952" rtl="0" eaLnBrk="1" latinLnBrk="0" hangingPunct="1">
         <a:lnSpc>
           <a:spcPct val="90000"/>
         </a:lnSpc>
         <a:spcBef>
-          <a:spcPts val="394"/>
+          <a:spcPts val="492"/>
         </a:spcBef>
         <a:buFont typeface="Arial" panose="020B0604020202020204" pitchFamily="34" charset="0"/>
         <a:buChar char="•"/>
-        <a:defRPr sz="1417" kern="1200">
+        <a:defRPr sz="1772" kern="1200">
           <a:solidFill>
             <a:schemeClr val="tx1"/>
           </a:solidFill>
@@ -2782,16 +2782,16 @@
           <a:cs typeface="+mn-cs"/>
         </a:defRPr>
       </a:lvl5pPr>
-      <a:lvl6pPr marL="1979745" indent="-179977" algn="l" defTabSz="719907" rtl="0" eaLnBrk="1" latinLnBrk="0" hangingPunct="1">
+      <a:lvl6pPr marL="2474869" indent="-224988" algn="l" defTabSz="899952" rtl="0" eaLnBrk="1" latinLnBrk="0" hangingPunct="1">
         <a:lnSpc>
           <a:spcPct val="90000"/>
         </a:lnSpc>
         <a:spcBef>
-          <a:spcPts val="394"/>
+          <a:spcPts val="492"/>
         </a:spcBef>
         <a:buFont typeface="Arial" panose="020B0604020202020204" pitchFamily="34" charset="0"/>
         <a:buChar char="•"/>
-        <a:defRPr sz="1417" kern="1200">
+        <a:defRPr sz="1772" kern="1200">
           <a:solidFill>
             <a:schemeClr val="tx1"/>
           </a:solidFill>
@@ -2800,16 +2800,16 @@
           <a:cs typeface="+mn-cs"/>
         </a:defRPr>
       </a:lvl6pPr>
-      <a:lvl7pPr marL="2339698" indent="-179977" algn="l" defTabSz="719907" rtl="0" eaLnBrk="1" latinLnBrk="0" hangingPunct="1">
+      <a:lvl7pPr marL="2924846" indent="-224988" algn="l" defTabSz="899952" rtl="0" eaLnBrk="1" latinLnBrk="0" hangingPunct="1">
         <a:lnSpc>
           <a:spcPct val="90000"/>
         </a:lnSpc>
         <a:spcBef>
-          <a:spcPts val="394"/>
+          <a:spcPts val="492"/>
         </a:spcBef>
         <a:buFont typeface="Arial" panose="020B0604020202020204" pitchFamily="34" charset="0"/>
         <a:buChar char="•"/>
-        <a:defRPr sz="1417" kern="1200">
+        <a:defRPr sz="1772" kern="1200">
           <a:solidFill>
             <a:schemeClr val="tx1"/>
           </a:solidFill>
@@ -2818,16 +2818,16 @@
           <a:cs typeface="+mn-cs"/>
         </a:defRPr>
       </a:lvl7pPr>
-      <a:lvl8pPr marL="2699652" indent="-179977" algn="l" defTabSz="719907" rtl="0" eaLnBrk="1" latinLnBrk="0" hangingPunct="1">
+      <a:lvl8pPr marL="3374822" indent="-224988" algn="l" defTabSz="899952" rtl="0" eaLnBrk="1" latinLnBrk="0" hangingPunct="1">
         <a:lnSpc>
           <a:spcPct val="90000"/>
         </a:lnSpc>
         <a:spcBef>
-          <a:spcPts val="394"/>
+          <a:spcPts val="492"/>
         </a:spcBef>
         <a:buFont typeface="Arial" panose="020B0604020202020204" pitchFamily="34" charset="0"/>
         <a:buChar char="•"/>
-        <a:defRPr sz="1417" kern="1200">
+        <a:defRPr sz="1772" kern="1200">
           <a:solidFill>
             <a:schemeClr val="tx1"/>
           </a:solidFill>
@@ -2836,16 +2836,16 @@
           <a:cs typeface="+mn-cs"/>
         </a:defRPr>
       </a:lvl8pPr>
-      <a:lvl9pPr marL="3059605" indent="-179977" algn="l" defTabSz="719907" rtl="0" eaLnBrk="1" latinLnBrk="0" hangingPunct="1">
+      <a:lvl9pPr marL="3824798" indent="-224988" algn="l" defTabSz="899952" rtl="0" eaLnBrk="1" latinLnBrk="0" hangingPunct="1">
         <a:lnSpc>
           <a:spcPct val="90000"/>
         </a:lnSpc>
         <a:spcBef>
-          <a:spcPts val="394"/>
+          <a:spcPts val="492"/>
         </a:spcBef>
         <a:buFont typeface="Arial" panose="020B0604020202020204" pitchFamily="34" charset="0"/>
         <a:buChar char="•"/>
-        <a:defRPr sz="1417" kern="1200">
+        <a:defRPr sz="1772" kern="1200">
           <a:solidFill>
             <a:schemeClr val="tx1"/>
           </a:solidFill>
@@ -2859,8 +2859,8 @@
       <a:defPPr>
         <a:defRPr lang="en-US"/>
       </a:defPPr>
-      <a:lvl1pPr marL="0" algn="l" defTabSz="719907" rtl="0" eaLnBrk="1" latinLnBrk="0" hangingPunct="1">
-        <a:defRPr sz="1417" kern="1200">
+      <a:lvl1pPr marL="0" algn="l" defTabSz="899952" rtl="0" eaLnBrk="1" latinLnBrk="0" hangingPunct="1">
+        <a:defRPr sz="1772" kern="1200">
           <a:solidFill>
             <a:schemeClr val="tx1"/>
           </a:solidFill>
@@ -2869,8 +2869,8 @@
           <a:cs typeface="+mn-cs"/>
         </a:defRPr>
       </a:lvl1pPr>
-      <a:lvl2pPr marL="359954" algn="l" defTabSz="719907" rtl="0" eaLnBrk="1" latinLnBrk="0" hangingPunct="1">
-        <a:defRPr sz="1417" kern="1200">
+      <a:lvl2pPr marL="449976" algn="l" defTabSz="899952" rtl="0" eaLnBrk="1" latinLnBrk="0" hangingPunct="1">
+        <a:defRPr sz="1772" kern="1200">
           <a:solidFill>
             <a:schemeClr val="tx1"/>
           </a:solidFill>
@@ -2879,8 +2879,8 @@
           <a:cs typeface="+mn-cs"/>
         </a:defRPr>
       </a:lvl2pPr>
-      <a:lvl3pPr marL="719907" algn="l" defTabSz="719907" rtl="0" eaLnBrk="1" latinLnBrk="0" hangingPunct="1">
-        <a:defRPr sz="1417" kern="1200">
+      <a:lvl3pPr marL="899952" algn="l" defTabSz="899952" rtl="0" eaLnBrk="1" latinLnBrk="0" hangingPunct="1">
+        <a:defRPr sz="1772" kern="1200">
           <a:solidFill>
             <a:schemeClr val="tx1"/>
           </a:solidFill>
@@ -2889,8 +2889,8 @@
           <a:cs typeface="+mn-cs"/>
         </a:defRPr>
       </a:lvl3pPr>
-      <a:lvl4pPr marL="1079861" algn="l" defTabSz="719907" rtl="0" eaLnBrk="1" latinLnBrk="0" hangingPunct="1">
-        <a:defRPr sz="1417" kern="1200">
+      <a:lvl4pPr marL="1349929" algn="l" defTabSz="899952" rtl="0" eaLnBrk="1" latinLnBrk="0" hangingPunct="1">
+        <a:defRPr sz="1772" kern="1200">
           <a:solidFill>
             <a:schemeClr val="tx1"/>
           </a:solidFill>
@@ -2899,8 +2899,8 @@
           <a:cs typeface="+mn-cs"/>
         </a:defRPr>
       </a:lvl4pPr>
-      <a:lvl5pPr marL="1439814" algn="l" defTabSz="719907" rtl="0" eaLnBrk="1" latinLnBrk="0" hangingPunct="1">
-        <a:defRPr sz="1417" kern="1200">
+      <a:lvl5pPr marL="1799905" algn="l" defTabSz="899952" rtl="0" eaLnBrk="1" latinLnBrk="0" hangingPunct="1">
+        <a:defRPr sz="1772" kern="1200">
           <a:solidFill>
             <a:schemeClr val="tx1"/>
           </a:solidFill>
@@ -2909,8 +2909,8 @@
           <a:cs typeface="+mn-cs"/>
         </a:defRPr>
       </a:lvl5pPr>
-      <a:lvl6pPr marL="1799768" algn="l" defTabSz="719907" rtl="0" eaLnBrk="1" latinLnBrk="0" hangingPunct="1">
-        <a:defRPr sz="1417" kern="1200">
+      <a:lvl6pPr marL="2249881" algn="l" defTabSz="899952" rtl="0" eaLnBrk="1" latinLnBrk="0" hangingPunct="1">
+        <a:defRPr sz="1772" kern="1200">
           <a:solidFill>
             <a:schemeClr val="tx1"/>
           </a:solidFill>
@@ -2919,8 +2919,8 @@
           <a:cs typeface="+mn-cs"/>
         </a:defRPr>
       </a:lvl6pPr>
-      <a:lvl7pPr marL="2159721" algn="l" defTabSz="719907" rtl="0" eaLnBrk="1" latinLnBrk="0" hangingPunct="1">
-        <a:defRPr sz="1417" kern="1200">
+      <a:lvl7pPr marL="2699857" algn="l" defTabSz="899952" rtl="0" eaLnBrk="1" latinLnBrk="0" hangingPunct="1">
+        <a:defRPr sz="1772" kern="1200">
           <a:solidFill>
             <a:schemeClr val="tx1"/>
           </a:solidFill>
@@ -2929,8 +2929,8 @@
           <a:cs typeface="+mn-cs"/>
         </a:defRPr>
       </a:lvl7pPr>
-      <a:lvl8pPr marL="2519675" algn="l" defTabSz="719907" rtl="0" eaLnBrk="1" latinLnBrk="0" hangingPunct="1">
-        <a:defRPr sz="1417" kern="1200">
+      <a:lvl8pPr marL="3149834" algn="l" defTabSz="899952" rtl="0" eaLnBrk="1" latinLnBrk="0" hangingPunct="1">
+        <a:defRPr sz="1772" kern="1200">
           <a:solidFill>
             <a:schemeClr val="tx1"/>
           </a:solidFill>
@@ -2939,8 +2939,8 @@
           <a:cs typeface="+mn-cs"/>
         </a:defRPr>
       </a:lvl8pPr>
-      <a:lvl9pPr marL="2879628" algn="l" defTabSz="719907" rtl="0" eaLnBrk="1" latinLnBrk="0" hangingPunct="1">
-        <a:defRPr sz="1417" kern="1200">
+      <a:lvl9pPr marL="3599810" algn="l" defTabSz="899952" rtl="0" eaLnBrk="1" latinLnBrk="0" hangingPunct="1">
+        <a:defRPr sz="1772" kern="1200">
           <a:solidFill>
             <a:schemeClr val="tx1"/>
           </a:solidFill>
@@ -2979,8 +2979,8 @@
         </p:nvSpPr>
         <p:spPr>
           <a:xfrm>
-            <a:off x="1774485" y="512015"/>
-            <a:ext cx="3650343" cy="6175284"/>
+            <a:off x="2218205" y="640048"/>
+            <a:ext cx="4563130" cy="7719445"/>
           </a:xfrm>
           <a:prstGeom prst="roundRect">
             <a:avLst>
@@ -3014,7 +3014,7 @@
           </a:fontRef>
         </p:style>
         <p:txBody>
-          <a:bodyPr rot="0" spcFirstLastPara="0" vertOverflow="overflow" horzOverflow="overflow" vert="horz" wrap="square" lIns="365679" tIns="182840" rIns="365679" bIns="182840" numCol="1" spcCol="0" rtlCol="0" fromWordArt="0" anchor="ctr" anchorCtr="0" forceAA="0" compatLnSpc="1">
+          <a:bodyPr rot="0" spcFirstLastPara="0" vertOverflow="overflow" horzOverflow="overflow" vert="horz" wrap="square" lIns="457119" tIns="228560" rIns="457119" bIns="228560" numCol="1" spcCol="0" rtlCol="0" fromWordArt="0" anchor="ctr" anchorCtr="0" forceAA="0" compatLnSpc="1">
             <a:prstTxWarp prst="textNoShape">
               <a:avLst/>
             </a:prstTxWarp>
@@ -3023,7 +3023,7 @@
           <a:lstStyle/>
           <a:p>
             <a:pPr algn="ctr"/>
-            <a:endParaRPr lang="de-DE" sz="13599"/>
+            <a:endParaRPr lang="de-DE" sz="17000"/>
           </a:p>
         </p:txBody>
       </p:sp>
@@ -3035,8 +3035,8 @@
         </p:nvSpPr>
         <p:spPr>
           <a:xfrm>
-            <a:off x="3122502" y="785148"/>
-            <a:ext cx="954308" cy="190862"/>
+            <a:off x="3903300" y="981479"/>
+            <a:ext cx="1192938" cy="238588"/>
           </a:xfrm>
           <a:prstGeom prst="roundRect">
             <a:avLst>
@@ -3069,7 +3069,7 @@
           </a:fontRef>
         </p:style>
         <p:txBody>
-          <a:bodyPr rot="0" spcFirstLastPara="0" vertOverflow="overflow" horzOverflow="overflow" vert="horz" wrap="square" lIns="365679" tIns="182840" rIns="365679" bIns="182840" numCol="1" spcCol="0" rtlCol="0" fromWordArt="0" anchor="ctr" anchorCtr="0" forceAA="0" compatLnSpc="1">
+          <a:bodyPr rot="0" spcFirstLastPara="0" vertOverflow="overflow" horzOverflow="overflow" vert="horz" wrap="square" lIns="457119" tIns="228560" rIns="457119" bIns="228560" numCol="1" spcCol="0" rtlCol="0" fromWordArt="0" anchor="ctr" anchorCtr="0" forceAA="0" compatLnSpc="1">
             <a:prstTxWarp prst="textNoShape">
               <a:avLst/>
             </a:prstTxWarp>
@@ -3078,7 +3078,7 @@
           <a:lstStyle/>
           <a:p>
             <a:pPr algn="ctr"/>
-            <a:endParaRPr lang="de-DE" sz="13599"/>
+            <a:endParaRPr lang="de-DE" sz="17000"/>
           </a:p>
         </p:txBody>
       </p:sp>
@@ -3090,8 +3090,8 @@
         </p:nvSpPr>
         <p:spPr>
           <a:xfrm>
-            <a:off x="1983694" y="1224925"/>
-            <a:ext cx="3231924" cy="4463820"/>
+            <a:off x="2479728" y="1531224"/>
+            <a:ext cx="4040083" cy="5580021"/>
           </a:xfrm>
           <a:prstGeom prst="roundRect">
             <a:avLst>
@@ -3124,7 +3124,7 @@
           </a:fontRef>
         </p:style>
         <p:txBody>
-          <a:bodyPr rot="0" spcFirstLastPara="0" vertOverflow="overflow" horzOverflow="overflow" vert="horz" wrap="square" lIns="365679" tIns="182840" rIns="365679" bIns="182840" numCol="1" spcCol="0" rtlCol="0" fromWordArt="0" anchor="ctr" anchorCtr="0" forceAA="0" compatLnSpc="1">
+          <a:bodyPr rot="0" spcFirstLastPara="0" vertOverflow="overflow" horzOverflow="overflow" vert="horz" wrap="square" lIns="457119" tIns="228560" rIns="457119" bIns="228560" numCol="1" spcCol="0" rtlCol="0" fromWordArt="0" anchor="ctr" anchorCtr="0" forceAA="0" compatLnSpc="1">
             <a:prstTxWarp prst="textNoShape">
               <a:avLst/>
             </a:prstTxWarp>
@@ -3133,7 +3133,7 @@
           <a:lstStyle/>
           <a:p>
             <a:pPr algn="ctr"/>
-            <a:endParaRPr lang="de-DE" sz="13599"/>
+            <a:endParaRPr lang="de-DE" sz="17000"/>
           </a:p>
         </p:txBody>
       </p:sp>
@@ -3145,8 +3145,8 @@
         </p:nvSpPr>
         <p:spPr>
           <a:xfrm>
-            <a:off x="3326997" y="5905168"/>
-            <a:ext cx="545319" cy="545319"/>
+            <a:off x="4158931" y="7381787"/>
+            <a:ext cx="681679" cy="681679"/>
           </a:xfrm>
           <a:prstGeom prst="roundRect">
             <a:avLst>
@@ -3179,7 +3179,7 @@
           </a:fontRef>
         </p:style>
         <p:txBody>
-          <a:bodyPr rot="0" spcFirstLastPara="0" vertOverflow="overflow" horzOverflow="overflow" vert="horz" wrap="square" lIns="365679" tIns="182840" rIns="365679" bIns="182840" numCol="1" spcCol="0" rtlCol="0" fromWordArt="0" anchor="ctr" anchorCtr="0" forceAA="0" compatLnSpc="1">
+          <a:bodyPr rot="0" spcFirstLastPara="0" vertOverflow="overflow" horzOverflow="overflow" vert="horz" wrap="square" lIns="457119" tIns="228560" rIns="457119" bIns="228560" numCol="1" spcCol="0" rtlCol="0" fromWordArt="0" anchor="ctr" anchorCtr="0" forceAA="0" compatLnSpc="1">
             <a:prstTxWarp prst="textNoShape">
               <a:avLst/>
             </a:prstTxWarp>
@@ -3188,7 +3188,7 @@
           <a:lstStyle/>
           <a:p>
             <a:pPr algn="ctr"/>
-            <a:endParaRPr lang="de-DE" sz="13599"/>
+            <a:endParaRPr lang="de-DE" sz="17000"/>
           </a:p>
         </p:txBody>
       </p:sp>
@@ -3200,8 +3200,8 @@
         </p:nvSpPr>
         <p:spPr>
           <a:xfrm>
-            <a:off x="2250177" y="1548373"/>
-            <a:ext cx="681649" cy="681649"/>
+            <a:off x="2812846" y="1935553"/>
+            <a:ext cx="852099" cy="852099"/>
           </a:xfrm>
           <a:prstGeom prst="roundRect">
             <a:avLst>
@@ -3232,7 +3232,7 @@
           </a:fontRef>
         </p:style>
         <p:txBody>
-          <a:bodyPr rot="0" spcFirstLastPara="0" vertOverflow="overflow" horzOverflow="overflow" vert="horz" wrap="square" lIns="365679" tIns="182840" rIns="365679" bIns="182840" numCol="1" spcCol="0" rtlCol="0" fromWordArt="0" anchor="ctr" anchorCtr="0" forceAA="0" compatLnSpc="1">
+          <a:bodyPr rot="0" spcFirstLastPara="0" vertOverflow="overflow" horzOverflow="overflow" vert="horz" wrap="square" lIns="457119" tIns="228560" rIns="457119" bIns="228560" numCol="1" spcCol="0" rtlCol="0" fromWordArt="0" anchor="ctr" anchorCtr="0" forceAA="0" compatLnSpc="1">
             <a:prstTxWarp prst="textNoShape">
               <a:avLst/>
             </a:prstTxWarp>
@@ -3241,7 +3241,7 @@
           <a:lstStyle/>
           <a:p>
             <a:pPr algn="ctr"/>
-            <a:endParaRPr lang="de-DE" sz="13599"/>
+            <a:endParaRPr lang="de-DE" sz="17000"/>
           </a:p>
         </p:txBody>
       </p:sp>
@@ -3253,8 +3253,8 @@
         </p:nvSpPr>
         <p:spPr>
           <a:xfrm>
-            <a:off x="4267488" y="1548373"/>
-            <a:ext cx="681649" cy="681649"/>
+            <a:off x="5334596" y="1935553"/>
+            <a:ext cx="852099" cy="852099"/>
           </a:xfrm>
           <a:prstGeom prst="roundRect">
             <a:avLst>
@@ -3285,7 +3285,7 @@
           </a:fontRef>
         </p:style>
         <p:txBody>
-          <a:bodyPr rot="0" spcFirstLastPara="0" vertOverflow="overflow" horzOverflow="overflow" vert="horz" wrap="square" lIns="365679" tIns="182840" rIns="365679" bIns="182840" numCol="1" spcCol="0" rtlCol="0" fromWordArt="0" anchor="ctr" anchorCtr="0" forceAA="0" compatLnSpc="1">
+          <a:bodyPr rot="0" spcFirstLastPara="0" vertOverflow="overflow" horzOverflow="overflow" vert="horz" wrap="square" lIns="457119" tIns="228560" rIns="457119" bIns="228560" numCol="1" spcCol="0" rtlCol="0" fromWordArt="0" anchor="ctr" anchorCtr="0" forceAA="0" compatLnSpc="1">
             <a:prstTxWarp prst="textNoShape">
               <a:avLst/>
             </a:prstTxWarp>
@@ -3294,7 +3294,7 @@
           <a:lstStyle/>
           <a:p>
             <a:pPr algn="ctr"/>
-            <a:endParaRPr lang="de-DE" sz="13599"/>
+            <a:endParaRPr lang="de-DE" sz="17000"/>
           </a:p>
         </p:txBody>
       </p:sp>
@@ -3306,8 +3306,8 @@
         </p:nvSpPr>
         <p:spPr>
           <a:xfrm>
-            <a:off x="3258832" y="1548373"/>
-            <a:ext cx="681649" cy="681649"/>
+            <a:off x="4073721" y="1935553"/>
+            <a:ext cx="852099" cy="852099"/>
           </a:xfrm>
           <a:prstGeom prst="roundRect">
             <a:avLst>
@@ -3338,7 +3338,7 @@
           </a:fontRef>
         </p:style>
         <p:txBody>
-          <a:bodyPr rot="0" spcFirstLastPara="0" vertOverflow="overflow" horzOverflow="overflow" vert="horz" wrap="square" lIns="365679" tIns="182840" rIns="365679" bIns="182840" numCol="1" spcCol="0" rtlCol="0" fromWordArt="0" anchor="ctr" anchorCtr="0" forceAA="0" compatLnSpc="1">
+          <a:bodyPr rot="0" spcFirstLastPara="0" vertOverflow="overflow" horzOverflow="overflow" vert="horz" wrap="square" lIns="457119" tIns="228560" rIns="457119" bIns="228560" numCol="1" spcCol="0" rtlCol="0" fromWordArt="0" anchor="ctr" anchorCtr="0" forceAA="0" compatLnSpc="1">
             <a:prstTxWarp prst="textNoShape">
               <a:avLst/>
             </a:prstTxWarp>
@@ -3347,7 +3347,7 @@
           <a:lstStyle/>
           <a:p>
             <a:pPr algn="ctr"/>
-            <a:endParaRPr lang="de-DE" sz="13599"/>
+            <a:endParaRPr lang="de-DE" sz="17000"/>
           </a:p>
         </p:txBody>
       </p:sp>
@@ -3359,8 +3359,8 @@
         </p:nvSpPr>
         <p:spPr>
           <a:xfrm>
-            <a:off x="2250177" y="2602107"/>
-            <a:ext cx="681649" cy="681649"/>
+            <a:off x="2812846" y="3252778"/>
+            <a:ext cx="852099" cy="852099"/>
           </a:xfrm>
           <a:prstGeom prst="roundRect">
             <a:avLst>
@@ -3391,7 +3391,7 @@
           </a:fontRef>
         </p:style>
         <p:txBody>
-          <a:bodyPr rot="0" spcFirstLastPara="0" vertOverflow="overflow" horzOverflow="overflow" vert="horz" wrap="square" lIns="365679" tIns="182840" rIns="365679" bIns="182840" numCol="1" spcCol="0" rtlCol="0" fromWordArt="0" anchor="ctr" anchorCtr="0" forceAA="0" compatLnSpc="1">
+          <a:bodyPr rot="0" spcFirstLastPara="0" vertOverflow="overflow" horzOverflow="overflow" vert="horz" wrap="square" lIns="457119" tIns="228560" rIns="457119" bIns="228560" numCol="1" spcCol="0" rtlCol="0" fromWordArt="0" anchor="ctr" anchorCtr="0" forceAA="0" compatLnSpc="1">
             <a:prstTxWarp prst="textNoShape">
               <a:avLst/>
             </a:prstTxWarp>
@@ -3400,7 +3400,7 @@
           <a:lstStyle/>
           <a:p>
             <a:pPr algn="ctr"/>
-            <a:endParaRPr lang="de-DE" sz="13599"/>
+            <a:endParaRPr lang="de-DE" sz="17000"/>
           </a:p>
         </p:txBody>
       </p:sp>
@@ -3412,8 +3412,8 @@
         </p:nvSpPr>
         <p:spPr>
           <a:xfrm>
-            <a:off x="4267488" y="2602107"/>
-            <a:ext cx="681649" cy="681649"/>
+            <a:off x="5334596" y="3252778"/>
+            <a:ext cx="852099" cy="852099"/>
           </a:xfrm>
           <a:prstGeom prst="roundRect">
             <a:avLst>
@@ -3444,7 +3444,7 @@
           </a:fontRef>
         </p:style>
         <p:txBody>
-          <a:bodyPr rot="0" spcFirstLastPara="0" vertOverflow="overflow" horzOverflow="overflow" vert="horz" wrap="square" lIns="365679" tIns="182840" rIns="365679" bIns="182840" numCol="1" spcCol="0" rtlCol="0" fromWordArt="0" anchor="ctr" anchorCtr="0" forceAA="0" compatLnSpc="1">
+          <a:bodyPr rot="0" spcFirstLastPara="0" vertOverflow="overflow" horzOverflow="overflow" vert="horz" wrap="square" lIns="457119" tIns="228560" rIns="457119" bIns="228560" numCol="1" spcCol="0" rtlCol="0" fromWordArt="0" anchor="ctr" anchorCtr="0" forceAA="0" compatLnSpc="1">
             <a:prstTxWarp prst="textNoShape">
               <a:avLst/>
             </a:prstTxWarp>
@@ -3453,7 +3453,7 @@
           <a:lstStyle/>
           <a:p>
             <a:pPr algn="ctr"/>
-            <a:endParaRPr lang="de-DE" sz="13599"/>
+            <a:endParaRPr lang="de-DE" sz="17000"/>
           </a:p>
         </p:txBody>
       </p:sp>
@@ -3465,8 +3465,8 @@
         </p:nvSpPr>
         <p:spPr>
           <a:xfrm>
-            <a:off x="3258832" y="2602107"/>
-            <a:ext cx="681649" cy="681649"/>
+            <a:off x="4073721" y="3252778"/>
+            <a:ext cx="852099" cy="852099"/>
           </a:xfrm>
           <a:prstGeom prst="roundRect">
             <a:avLst>
@@ -3497,7 +3497,7 @@
           </a:fontRef>
         </p:style>
         <p:txBody>
-          <a:bodyPr rot="0" spcFirstLastPara="0" vertOverflow="overflow" horzOverflow="overflow" vert="horz" wrap="square" lIns="365679" tIns="182840" rIns="365679" bIns="182840" numCol="1" spcCol="0" rtlCol="0" fromWordArt="0" anchor="ctr" anchorCtr="0" forceAA="0" compatLnSpc="1">
+          <a:bodyPr rot="0" spcFirstLastPara="0" vertOverflow="overflow" horzOverflow="overflow" vert="horz" wrap="square" lIns="457119" tIns="228560" rIns="457119" bIns="228560" numCol="1" spcCol="0" rtlCol="0" fromWordArt="0" anchor="ctr" anchorCtr="0" forceAA="0" compatLnSpc="1">
             <a:prstTxWarp prst="textNoShape">
               <a:avLst/>
             </a:prstTxWarp>
@@ -3506,7 +3506,7 @@
           <a:lstStyle/>
           <a:p>
             <a:pPr algn="ctr"/>
-            <a:endParaRPr lang="de-DE" sz="13599"/>
+            <a:endParaRPr lang="de-DE" sz="17000"/>
           </a:p>
         </p:txBody>
       </p:sp>
@@ -3518,8 +3518,8 @@
         </p:nvSpPr>
         <p:spPr>
           <a:xfrm>
-            <a:off x="2250177" y="3655841"/>
-            <a:ext cx="681649" cy="681649"/>
+            <a:off x="2812846" y="4570004"/>
+            <a:ext cx="852099" cy="852099"/>
           </a:xfrm>
           <a:prstGeom prst="roundRect">
             <a:avLst>
@@ -3550,7 +3550,7 @@
           </a:fontRef>
         </p:style>
         <p:txBody>
-          <a:bodyPr rot="0" spcFirstLastPara="0" vertOverflow="overflow" horzOverflow="overflow" vert="horz" wrap="square" lIns="365679" tIns="182840" rIns="365679" bIns="182840" numCol="1" spcCol="0" rtlCol="0" fromWordArt="0" anchor="ctr" anchorCtr="0" forceAA="0" compatLnSpc="1">
+          <a:bodyPr rot="0" spcFirstLastPara="0" vertOverflow="overflow" horzOverflow="overflow" vert="horz" wrap="square" lIns="457119" tIns="228560" rIns="457119" bIns="228560" numCol="1" spcCol="0" rtlCol="0" fromWordArt="0" anchor="ctr" anchorCtr="0" forceAA="0" compatLnSpc="1">
             <a:prstTxWarp prst="textNoShape">
               <a:avLst/>
             </a:prstTxWarp>
@@ -3559,7 +3559,7 @@
           <a:lstStyle/>
           <a:p>
             <a:pPr algn="ctr"/>
-            <a:endParaRPr lang="de-DE" sz="13599"/>
+            <a:endParaRPr lang="de-DE" sz="17000"/>
           </a:p>
         </p:txBody>
       </p:sp>
@@ -3571,8 +3571,8 @@
         </p:nvSpPr>
         <p:spPr>
           <a:xfrm>
-            <a:off x="4267488" y="3655841"/>
-            <a:ext cx="681649" cy="681649"/>
+            <a:off x="5334596" y="4570004"/>
+            <a:ext cx="852099" cy="852099"/>
           </a:xfrm>
           <a:prstGeom prst="roundRect">
             <a:avLst>
@@ -3603,7 +3603,7 @@
           </a:fontRef>
         </p:style>
         <p:txBody>
-          <a:bodyPr rot="0" spcFirstLastPara="0" vertOverflow="overflow" horzOverflow="overflow" vert="horz" wrap="square" lIns="365679" tIns="182840" rIns="365679" bIns="182840" numCol="1" spcCol="0" rtlCol="0" fromWordArt="0" anchor="ctr" anchorCtr="0" forceAA="0" compatLnSpc="1">
+          <a:bodyPr rot="0" spcFirstLastPara="0" vertOverflow="overflow" horzOverflow="overflow" vert="horz" wrap="square" lIns="457119" tIns="228560" rIns="457119" bIns="228560" numCol="1" spcCol="0" rtlCol="0" fromWordArt="0" anchor="ctr" anchorCtr="0" forceAA="0" compatLnSpc="1">
             <a:prstTxWarp prst="textNoShape">
               <a:avLst/>
             </a:prstTxWarp>
@@ -3612,7 +3612,7 @@
           <a:lstStyle/>
           <a:p>
             <a:pPr algn="ctr"/>
-            <a:endParaRPr lang="de-DE" sz="13599"/>
+            <a:endParaRPr lang="de-DE" sz="17000"/>
           </a:p>
         </p:txBody>
       </p:sp>
@@ -3624,8 +3624,8 @@
         </p:nvSpPr>
         <p:spPr>
           <a:xfrm>
-            <a:off x="3258832" y="3655841"/>
-            <a:ext cx="681649" cy="681649"/>
+            <a:off x="4073721" y="4570004"/>
+            <a:ext cx="852099" cy="852099"/>
           </a:xfrm>
           <a:prstGeom prst="roundRect">
             <a:avLst>
@@ -3656,7 +3656,7 @@
           </a:fontRef>
         </p:style>
         <p:txBody>
-          <a:bodyPr rot="0" spcFirstLastPara="0" vertOverflow="overflow" horzOverflow="overflow" vert="horz" wrap="square" lIns="365679" tIns="182840" rIns="365679" bIns="182840" numCol="1" spcCol="0" rtlCol="0" fromWordArt="0" anchor="ctr" anchorCtr="0" forceAA="0" compatLnSpc="1">
+          <a:bodyPr rot="0" spcFirstLastPara="0" vertOverflow="overflow" horzOverflow="overflow" vert="horz" wrap="square" lIns="457119" tIns="228560" rIns="457119" bIns="228560" numCol="1" spcCol="0" rtlCol="0" fromWordArt="0" anchor="ctr" anchorCtr="0" forceAA="0" compatLnSpc="1">
             <a:prstTxWarp prst="textNoShape">
               <a:avLst/>
             </a:prstTxWarp>
@@ -3665,7 +3665,7 @@
           <a:lstStyle/>
           <a:p>
             <a:pPr algn="ctr"/>
-            <a:endParaRPr lang="de-DE" sz="13599"/>
+            <a:endParaRPr lang="de-DE" sz="17000"/>
           </a:p>
         </p:txBody>
       </p:sp>
@@ -3677,8 +3677,8 @@
         </p:nvSpPr>
         <p:spPr>
           <a:xfrm>
-            <a:off x="2250177" y="4709576"/>
-            <a:ext cx="681649" cy="681649"/>
+            <a:off x="2812846" y="5887231"/>
+            <a:ext cx="852099" cy="852099"/>
           </a:xfrm>
           <a:prstGeom prst="roundRect">
             <a:avLst>
@@ -3709,7 +3709,7 @@
           </a:fontRef>
         </p:style>
         <p:txBody>
-          <a:bodyPr rot="0" spcFirstLastPara="0" vertOverflow="overflow" horzOverflow="overflow" vert="horz" wrap="square" lIns="365679" tIns="182840" rIns="365679" bIns="182840" numCol="1" spcCol="0" rtlCol="0" fromWordArt="0" anchor="ctr" anchorCtr="0" forceAA="0" compatLnSpc="1">
+          <a:bodyPr rot="0" spcFirstLastPara="0" vertOverflow="overflow" horzOverflow="overflow" vert="horz" wrap="square" lIns="457119" tIns="228560" rIns="457119" bIns="228560" numCol="1" spcCol="0" rtlCol="0" fromWordArt="0" anchor="ctr" anchorCtr="0" forceAA="0" compatLnSpc="1">
             <a:prstTxWarp prst="textNoShape">
               <a:avLst/>
             </a:prstTxWarp>
@@ -3718,7 +3718,7 @@
           <a:lstStyle/>
           <a:p>
             <a:pPr algn="ctr"/>
-            <a:endParaRPr lang="de-DE" sz="13599"/>
+            <a:endParaRPr lang="de-DE" sz="17000"/>
           </a:p>
         </p:txBody>
       </p:sp>
@@ -3730,8 +3730,8 @@
         </p:nvSpPr>
         <p:spPr>
           <a:xfrm>
-            <a:off x="4267488" y="4709576"/>
-            <a:ext cx="681649" cy="681649"/>
+            <a:off x="5334596" y="5887231"/>
+            <a:ext cx="852099" cy="852099"/>
           </a:xfrm>
           <a:prstGeom prst="roundRect">
             <a:avLst>
@@ -3762,7 +3762,7 @@
           </a:fontRef>
         </p:style>
         <p:txBody>
-          <a:bodyPr rot="0" spcFirstLastPara="0" vertOverflow="overflow" horzOverflow="overflow" vert="horz" wrap="square" lIns="365679" tIns="182840" rIns="365679" bIns="182840" numCol="1" spcCol="0" rtlCol="0" fromWordArt="0" anchor="ctr" anchorCtr="0" forceAA="0" compatLnSpc="1">
+          <a:bodyPr rot="0" spcFirstLastPara="0" vertOverflow="overflow" horzOverflow="overflow" vert="horz" wrap="square" lIns="457119" tIns="228560" rIns="457119" bIns="228560" numCol="1" spcCol="0" rtlCol="0" fromWordArt="0" anchor="ctr" anchorCtr="0" forceAA="0" compatLnSpc="1">
             <a:prstTxWarp prst="textNoShape">
               <a:avLst/>
             </a:prstTxWarp>
@@ -3771,7 +3771,7 @@
           <a:lstStyle/>
           <a:p>
             <a:pPr algn="ctr"/>
-            <a:endParaRPr lang="de-DE" sz="13599"/>
+            <a:endParaRPr lang="de-DE" sz="17000"/>
           </a:p>
         </p:txBody>
       </p:sp>
@@ -3783,8 +3783,8 @@
         </p:nvSpPr>
         <p:spPr>
           <a:xfrm>
-            <a:off x="3258832" y="4709576"/>
-            <a:ext cx="681649" cy="681649"/>
+            <a:off x="4073721" y="5887231"/>
+            <a:ext cx="852099" cy="852099"/>
           </a:xfrm>
           <a:prstGeom prst="roundRect">
             <a:avLst>
@@ -3815,7 +3815,7 @@
           </a:fontRef>
         </p:style>
         <p:txBody>
-          <a:bodyPr rot="0" spcFirstLastPara="0" vertOverflow="overflow" horzOverflow="overflow" vert="horz" wrap="square" lIns="365679" tIns="182840" rIns="365679" bIns="182840" numCol="1" spcCol="0" rtlCol="0" fromWordArt="0" anchor="ctr" anchorCtr="0" forceAA="0" compatLnSpc="1">
+          <a:bodyPr rot="0" spcFirstLastPara="0" vertOverflow="overflow" horzOverflow="overflow" vert="horz" wrap="square" lIns="457119" tIns="228560" rIns="457119" bIns="228560" numCol="1" spcCol="0" rtlCol="0" fromWordArt="0" anchor="ctr" anchorCtr="0" forceAA="0" compatLnSpc="1">
             <a:prstTxWarp prst="textNoShape">
               <a:avLst/>
             </a:prstTxWarp>
@@ -3824,7 +3824,7 @@
           <a:lstStyle/>
           <a:p>
             <a:pPr algn="ctr"/>
-            <a:endParaRPr lang="de-DE" sz="13599"/>
+            <a:endParaRPr lang="de-DE" sz="17000"/>
           </a:p>
         </p:txBody>
       </p:sp>
@@ -3836,8 +3836,8 @@
         </p:nvSpPr>
         <p:spPr>
           <a:xfrm>
-            <a:off x="-1" y="-1"/>
-            <a:ext cx="7199313" cy="7199313"/>
+            <a:off x="0" y="0"/>
+            <a:ext cx="8999538" cy="8999538"/>
           </a:xfrm>
           <a:prstGeom prst="rect">
             <a:avLst/>
@@ -3868,7 +3868,7 @@
           <a:lstStyle/>
           <a:p>
             <a:pPr algn="ctr"/>
-            <a:endParaRPr lang="de-DE" sz="1088"/>
+            <a:endParaRPr lang="de-DE" sz="1360"/>
           </a:p>
         </p:txBody>
       </p:sp>

</xml_diff>